<commit_message>
Changed up Conclusion and Project challenges slides
</commit_message>
<xml_diff>
--- a/Project4_presentation.pptx
+++ b/Project4_presentation.pptx
@@ -4,6 +4,9 @@
   <p:sldMasterIdLst>
     <p:sldMasterId id="2147483707" r:id="rId1"/>
   </p:sldMasterIdLst>
+  <p:notesMasterIdLst>
+    <p:notesMasterId r:id="rId19"/>
+  </p:notesMasterIdLst>
   <p:sldIdLst>
     <p:sldId id="256" r:id="rId2"/>
     <p:sldId id="266" r:id="rId3"/>
@@ -19,8 +22,8 @@
     <p:sldId id="282" r:id="rId13"/>
     <p:sldId id="285" r:id="rId14"/>
     <p:sldId id="279" r:id="rId15"/>
-    <p:sldId id="275" r:id="rId16"/>
-    <p:sldId id="271" r:id="rId17"/>
+    <p:sldId id="271" r:id="rId16"/>
+    <p:sldId id="275" r:id="rId17"/>
     <p:sldId id="274" r:id="rId18"/>
   </p:sldIdLst>
   <p:sldSz cx="12192000" cy="6858000"/>
@@ -140,6 +143,457 @@
 </p:cmAuthorLst>
 </file>
 
+<file path=ppt/notesMasters/notesMaster1.xml><?xml version="1.0" encoding="utf-8"?>
+<p:notesMaster xmlns:a="http://schemas.openxmlformats.org/drawingml/2006/main" xmlns:r="http://schemas.openxmlformats.org/officeDocument/2006/relationships" xmlns:p="http://schemas.openxmlformats.org/presentationml/2006/main">
+  <p:cSld>
+    <p:bg>
+      <p:bgRef idx="1001">
+        <a:schemeClr val="bg1"/>
+      </p:bgRef>
+    </p:bg>
+    <p:spTree>
+      <p:nvGrpSpPr>
+        <p:cNvPr id="1" name=""/>
+        <p:cNvGrpSpPr/>
+        <p:nvPr/>
+      </p:nvGrpSpPr>
+      <p:grpSpPr>
+        <a:xfrm>
+          <a:off x="0" y="0"/>
+          <a:ext cx="0" cy="0"/>
+          <a:chOff x="0" y="0"/>
+          <a:chExt cx="0" cy="0"/>
+        </a:xfrm>
+      </p:grpSpPr>
+      <p:sp>
+        <p:nvSpPr>
+          <p:cNvPr id="2" name="Header Placeholder 1"/>
+          <p:cNvSpPr>
+            <a:spLocks noGrp="1"/>
+          </p:cNvSpPr>
+          <p:nvPr>
+            <p:ph type="hdr" sz="quarter"/>
+          </p:nvPr>
+        </p:nvSpPr>
+        <p:spPr>
+          <a:xfrm>
+            <a:off x="0" y="0"/>
+            <a:ext cx="2971800" cy="458788"/>
+          </a:xfrm>
+          <a:prstGeom prst="rect">
+            <a:avLst/>
+          </a:prstGeom>
+        </p:spPr>
+        <p:txBody>
+          <a:bodyPr vert="horz" lIns="91440" tIns="45720" rIns="91440" bIns="45720" rtlCol="0"/>
+          <a:lstStyle>
+            <a:lvl1pPr algn="l">
+              <a:defRPr sz="1200"/>
+            </a:lvl1pPr>
+          </a:lstStyle>
+          <a:p>
+            <a:endParaRPr lang="en-US"/>
+          </a:p>
+        </p:txBody>
+      </p:sp>
+      <p:sp>
+        <p:nvSpPr>
+          <p:cNvPr id="3" name="Date Placeholder 2"/>
+          <p:cNvSpPr>
+            <a:spLocks noGrp="1"/>
+          </p:cNvSpPr>
+          <p:nvPr>
+            <p:ph type="dt" idx="1"/>
+          </p:nvPr>
+        </p:nvSpPr>
+        <p:spPr>
+          <a:xfrm>
+            <a:off x="3884613" y="0"/>
+            <a:ext cx="2971800" cy="458788"/>
+          </a:xfrm>
+          <a:prstGeom prst="rect">
+            <a:avLst/>
+          </a:prstGeom>
+        </p:spPr>
+        <p:txBody>
+          <a:bodyPr vert="horz" lIns="91440" tIns="45720" rIns="91440" bIns="45720" rtlCol="0"/>
+          <a:lstStyle>
+            <a:lvl1pPr algn="r">
+              <a:defRPr sz="1200"/>
+            </a:lvl1pPr>
+          </a:lstStyle>
+          <a:p>
+            <a:fld id="{E259F5B7-31D3-0A4F-B1B8-750BC252C6EA}" type="datetimeFigureOut">
+              <a:rPr lang="en-US" smtClean="0"/>
+              <a:t>8/31/22</a:t>
+            </a:fld>
+            <a:endParaRPr lang="en-US"/>
+          </a:p>
+        </p:txBody>
+      </p:sp>
+      <p:sp>
+        <p:nvSpPr>
+          <p:cNvPr id="4" name="Slide Image Placeholder 3"/>
+          <p:cNvSpPr>
+            <a:spLocks noGrp="1" noRot="1" noChangeAspect="1"/>
+          </p:cNvSpPr>
+          <p:nvPr>
+            <p:ph type="sldImg" idx="2"/>
+          </p:nvPr>
+        </p:nvSpPr>
+        <p:spPr>
+          <a:xfrm>
+            <a:off x="685800" y="1143000"/>
+            <a:ext cx="5486400" cy="3086100"/>
+          </a:xfrm>
+          <a:prstGeom prst="rect">
+            <a:avLst/>
+          </a:prstGeom>
+          <a:noFill/>
+          <a:ln w="12700">
+            <a:solidFill>
+              <a:prstClr val="black"/>
+            </a:solidFill>
+          </a:ln>
+        </p:spPr>
+        <p:txBody>
+          <a:bodyPr vert="horz" lIns="91440" tIns="45720" rIns="91440" bIns="45720" rtlCol="0" anchor="ctr"/>
+          <a:lstStyle/>
+          <a:p>
+            <a:endParaRPr lang="en-US"/>
+          </a:p>
+        </p:txBody>
+      </p:sp>
+      <p:sp>
+        <p:nvSpPr>
+          <p:cNvPr id="5" name="Notes Placeholder 4"/>
+          <p:cNvSpPr>
+            <a:spLocks noGrp="1"/>
+          </p:cNvSpPr>
+          <p:nvPr>
+            <p:ph type="body" sz="quarter" idx="3"/>
+          </p:nvPr>
+        </p:nvSpPr>
+        <p:spPr>
+          <a:xfrm>
+            <a:off x="685800" y="4400550"/>
+            <a:ext cx="5486400" cy="3600450"/>
+          </a:xfrm>
+          <a:prstGeom prst="rect">
+            <a:avLst/>
+          </a:prstGeom>
+        </p:spPr>
+        <p:txBody>
+          <a:bodyPr vert="horz" lIns="91440" tIns="45720" rIns="91440" bIns="45720" rtlCol="0"/>
+          <a:lstStyle/>
+          <a:p>
+            <a:pPr lvl="0"/>
+            <a:r>
+              <a:rPr lang="en-US"/>
+              <a:t>Click to edit Master text styles</a:t>
+            </a:r>
+          </a:p>
+          <a:p>
+            <a:pPr lvl="1"/>
+            <a:r>
+              <a:rPr lang="en-US"/>
+              <a:t>Second level</a:t>
+            </a:r>
+          </a:p>
+          <a:p>
+            <a:pPr lvl="2"/>
+            <a:r>
+              <a:rPr lang="en-US"/>
+              <a:t>Third level</a:t>
+            </a:r>
+          </a:p>
+          <a:p>
+            <a:pPr lvl="3"/>
+            <a:r>
+              <a:rPr lang="en-US"/>
+              <a:t>Fourth level</a:t>
+            </a:r>
+          </a:p>
+          <a:p>
+            <a:pPr lvl="4"/>
+            <a:r>
+              <a:rPr lang="en-US"/>
+              <a:t>Fifth level</a:t>
+            </a:r>
+          </a:p>
+        </p:txBody>
+      </p:sp>
+      <p:sp>
+        <p:nvSpPr>
+          <p:cNvPr id="6" name="Footer Placeholder 5"/>
+          <p:cNvSpPr>
+            <a:spLocks noGrp="1"/>
+          </p:cNvSpPr>
+          <p:nvPr>
+            <p:ph type="ftr" sz="quarter" idx="4"/>
+          </p:nvPr>
+        </p:nvSpPr>
+        <p:spPr>
+          <a:xfrm>
+            <a:off x="0" y="8685213"/>
+            <a:ext cx="2971800" cy="458787"/>
+          </a:xfrm>
+          <a:prstGeom prst="rect">
+            <a:avLst/>
+          </a:prstGeom>
+        </p:spPr>
+        <p:txBody>
+          <a:bodyPr vert="horz" lIns="91440" tIns="45720" rIns="91440" bIns="45720" rtlCol="0" anchor="b"/>
+          <a:lstStyle>
+            <a:lvl1pPr algn="l">
+              <a:defRPr sz="1200"/>
+            </a:lvl1pPr>
+          </a:lstStyle>
+          <a:p>
+            <a:endParaRPr lang="en-US"/>
+          </a:p>
+        </p:txBody>
+      </p:sp>
+      <p:sp>
+        <p:nvSpPr>
+          <p:cNvPr id="7" name="Slide Number Placeholder 6"/>
+          <p:cNvSpPr>
+            <a:spLocks noGrp="1"/>
+          </p:cNvSpPr>
+          <p:nvPr>
+            <p:ph type="sldNum" sz="quarter" idx="5"/>
+          </p:nvPr>
+        </p:nvSpPr>
+        <p:spPr>
+          <a:xfrm>
+            <a:off x="3884613" y="8685213"/>
+            <a:ext cx="2971800" cy="458787"/>
+          </a:xfrm>
+          <a:prstGeom prst="rect">
+            <a:avLst/>
+          </a:prstGeom>
+        </p:spPr>
+        <p:txBody>
+          <a:bodyPr vert="horz" lIns="91440" tIns="45720" rIns="91440" bIns="45720" rtlCol="0" anchor="b"/>
+          <a:lstStyle>
+            <a:lvl1pPr algn="r">
+              <a:defRPr sz="1200"/>
+            </a:lvl1pPr>
+          </a:lstStyle>
+          <a:p>
+            <a:fld id="{4D39940C-728D-B149-8F23-980044317BA3}" type="slidenum">
+              <a:rPr lang="en-US" smtClean="0"/>
+              <a:t>‹#›</a:t>
+            </a:fld>
+            <a:endParaRPr lang="en-US"/>
+          </a:p>
+        </p:txBody>
+      </p:sp>
+    </p:spTree>
+    <p:extLst>
+      <p:ext uri="{BB962C8B-B14F-4D97-AF65-F5344CB8AC3E}">
+        <p14:creationId xmlns:p14="http://schemas.microsoft.com/office/powerpoint/2010/main" val="275772670"/>
+      </p:ext>
+    </p:extLst>
+  </p:cSld>
+  <p:clrMap bg1="lt1" tx1="dk1" bg2="lt2" tx2="dk2" accent1="accent1" accent2="accent2" accent3="accent3" accent4="accent4" accent5="accent5" accent6="accent6" hlink="hlink" folHlink="folHlink"/>
+  <p:notesStyle>
+    <a:lvl1pPr marL="0" algn="l" defTabSz="914400" rtl="0" eaLnBrk="1" latinLnBrk="0" hangingPunct="1">
+      <a:defRPr sz="1200" kern="1200">
+        <a:solidFill>
+          <a:schemeClr val="tx1"/>
+        </a:solidFill>
+        <a:latin typeface="+mn-lt"/>
+        <a:ea typeface="+mn-ea"/>
+        <a:cs typeface="+mn-cs"/>
+      </a:defRPr>
+    </a:lvl1pPr>
+    <a:lvl2pPr marL="457200" algn="l" defTabSz="914400" rtl="0" eaLnBrk="1" latinLnBrk="0" hangingPunct="1">
+      <a:defRPr sz="1200" kern="1200">
+        <a:solidFill>
+          <a:schemeClr val="tx1"/>
+        </a:solidFill>
+        <a:latin typeface="+mn-lt"/>
+        <a:ea typeface="+mn-ea"/>
+        <a:cs typeface="+mn-cs"/>
+      </a:defRPr>
+    </a:lvl2pPr>
+    <a:lvl3pPr marL="914400" algn="l" defTabSz="914400" rtl="0" eaLnBrk="1" latinLnBrk="0" hangingPunct="1">
+      <a:defRPr sz="1200" kern="1200">
+        <a:solidFill>
+          <a:schemeClr val="tx1"/>
+        </a:solidFill>
+        <a:latin typeface="+mn-lt"/>
+        <a:ea typeface="+mn-ea"/>
+        <a:cs typeface="+mn-cs"/>
+      </a:defRPr>
+    </a:lvl3pPr>
+    <a:lvl4pPr marL="1371600" algn="l" defTabSz="914400" rtl="0" eaLnBrk="1" latinLnBrk="0" hangingPunct="1">
+      <a:defRPr sz="1200" kern="1200">
+        <a:solidFill>
+          <a:schemeClr val="tx1"/>
+        </a:solidFill>
+        <a:latin typeface="+mn-lt"/>
+        <a:ea typeface="+mn-ea"/>
+        <a:cs typeface="+mn-cs"/>
+      </a:defRPr>
+    </a:lvl4pPr>
+    <a:lvl5pPr marL="1828800" algn="l" defTabSz="914400" rtl="0" eaLnBrk="1" latinLnBrk="0" hangingPunct="1">
+      <a:defRPr sz="1200" kern="1200">
+        <a:solidFill>
+          <a:schemeClr val="tx1"/>
+        </a:solidFill>
+        <a:latin typeface="+mn-lt"/>
+        <a:ea typeface="+mn-ea"/>
+        <a:cs typeface="+mn-cs"/>
+      </a:defRPr>
+    </a:lvl5pPr>
+    <a:lvl6pPr marL="2286000" algn="l" defTabSz="914400" rtl="0" eaLnBrk="1" latinLnBrk="0" hangingPunct="1">
+      <a:defRPr sz="1200" kern="1200">
+        <a:solidFill>
+          <a:schemeClr val="tx1"/>
+        </a:solidFill>
+        <a:latin typeface="+mn-lt"/>
+        <a:ea typeface="+mn-ea"/>
+        <a:cs typeface="+mn-cs"/>
+      </a:defRPr>
+    </a:lvl6pPr>
+    <a:lvl7pPr marL="2743200" algn="l" defTabSz="914400" rtl="0" eaLnBrk="1" latinLnBrk="0" hangingPunct="1">
+      <a:defRPr sz="1200" kern="1200">
+        <a:solidFill>
+          <a:schemeClr val="tx1"/>
+        </a:solidFill>
+        <a:latin typeface="+mn-lt"/>
+        <a:ea typeface="+mn-ea"/>
+        <a:cs typeface="+mn-cs"/>
+      </a:defRPr>
+    </a:lvl7pPr>
+    <a:lvl8pPr marL="3200400" algn="l" defTabSz="914400" rtl="0" eaLnBrk="1" latinLnBrk="0" hangingPunct="1">
+      <a:defRPr sz="1200" kern="1200">
+        <a:solidFill>
+          <a:schemeClr val="tx1"/>
+        </a:solidFill>
+        <a:latin typeface="+mn-lt"/>
+        <a:ea typeface="+mn-ea"/>
+        <a:cs typeface="+mn-cs"/>
+      </a:defRPr>
+    </a:lvl8pPr>
+    <a:lvl9pPr marL="3657600" algn="l" defTabSz="914400" rtl="0" eaLnBrk="1" latinLnBrk="0" hangingPunct="1">
+      <a:defRPr sz="1200" kern="1200">
+        <a:solidFill>
+          <a:schemeClr val="tx1"/>
+        </a:solidFill>
+        <a:latin typeface="+mn-lt"/>
+        <a:ea typeface="+mn-ea"/>
+        <a:cs typeface="+mn-cs"/>
+      </a:defRPr>
+    </a:lvl9pPr>
+  </p:notesStyle>
+</p:notesMaster>
+</file>
+
+<file path=ppt/notesSlides/notesSlide1.xml><?xml version="1.0" encoding="utf-8"?>
+<p:notes xmlns:a="http://schemas.openxmlformats.org/drawingml/2006/main" xmlns:r="http://schemas.openxmlformats.org/officeDocument/2006/relationships" xmlns:p="http://schemas.openxmlformats.org/presentationml/2006/main">
+  <p:cSld>
+    <p:spTree>
+      <p:nvGrpSpPr>
+        <p:cNvPr id="1" name=""/>
+        <p:cNvGrpSpPr/>
+        <p:nvPr/>
+      </p:nvGrpSpPr>
+      <p:grpSpPr>
+        <a:xfrm>
+          <a:off x="0" y="0"/>
+          <a:ext cx="0" cy="0"/>
+          <a:chOff x="0" y="0"/>
+          <a:chExt cx="0" cy="0"/>
+        </a:xfrm>
+      </p:grpSpPr>
+      <p:sp>
+        <p:nvSpPr>
+          <p:cNvPr id="2" name="Slide Image Placeholder 1"/>
+          <p:cNvSpPr>
+            <a:spLocks noGrp="1" noRot="1" noChangeAspect="1"/>
+          </p:cNvSpPr>
+          <p:nvPr>
+            <p:ph type="sldImg"/>
+          </p:nvPr>
+        </p:nvSpPr>
+        <p:spPr/>
+      </p:sp>
+      <p:sp>
+        <p:nvSpPr>
+          <p:cNvPr id="3" name="Notes Placeholder 2"/>
+          <p:cNvSpPr>
+            <a:spLocks noGrp="1"/>
+          </p:cNvSpPr>
+          <p:nvPr>
+            <p:ph type="body" idx="1"/>
+          </p:nvPr>
+        </p:nvSpPr>
+        <p:spPr/>
+        <p:txBody>
+          <a:bodyPr/>
+          <a:lstStyle/>
+          <a:p>
+            <a:r>
+              <a:rPr lang="en-US" dirty="0"/>
+              <a:t>** going forward, further test our dataset by 1. Adding more previous data and look for data with minimal or no null values. , 2. Trying other models (decision tree classifier, create Deep Learning model, any model with binary classification).</a:t>
+            </a:r>
+          </a:p>
+          <a:p>
+            <a:endParaRPr lang="en-US" dirty="0"/>
+          </a:p>
+          <a:p>
+            <a:r>
+              <a:rPr lang="en-US" dirty="0"/>
+              <a:t>Future enhancement of this project could have been a flask app hosted on AWS server, where we could easily add new applicant information and get feedback for either approve or deny a new applicant. </a:t>
+            </a:r>
+          </a:p>
+          <a:p>
+            <a:endParaRPr lang="en-US" dirty="0"/>
+          </a:p>
+          <a:p>
+            <a:endParaRPr lang="en-US" dirty="0"/>
+          </a:p>
+        </p:txBody>
+      </p:sp>
+      <p:sp>
+        <p:nvSpPr>
+          <p:cNvPr id="4" name="Slide Number Placeholder 3"/>
+          <p:cNvSpPr>
+            <a:spLocks noGrp="1"/>
+          </p:cNvSpPr>
+          <p:nvPr>
+            <p:ph type="sldNum" sz="quarter" idx="5"/>
+          </p:nvPr>
+        </p:nvSpPr>
+        <p:spPr/>
+        <p:txBody>
+          <a:bodyPr/>
+          <a:lstStyle/>
+          <a:p>
+            <a:fld id="{4D39940C-728D-B149-8F23-980044317BA3}" type="slidenum">
+              <a:rPr lang="en-US" smtClean="0"/>
+              <a:t>16</a:t>
+            </a:fld>
+            <a:endParaRPr lang="en-US"/>
+          </a:p>
+        </p:txBody>
+      </p:sp>
+    </p:spTree>
+    <p:extLst>
+      <p:ext uri="{BB962C8B-B14F-4D97-AF65-F5344CB8AC3E}">
+        <p14:creationId xmlns:p14="http://schemas.microsoft.com/office/powerpoint/2010/main" val="2434000242"/>
+      </p:ext>
+    </p:extLst>
+  </p:cSld>
+  <p:clrMapOvr>
+    <a:masterClrMapping/>
+  </p:clrMapOvr>
+</p:notes>
+</file>
+
 <file path=ppt/slideLayouts/slideLayout1.xml><?xml version="1.0" encoding="utf-8"?>
 <p:sldLayout xmlns:a="http://schemas.openxmlformats.org/drawingml/2006/main" xmlns:r="http://schemas.openxmlformats.org/officeDocument/2006/relationships" xmlns:p="http://schemas.openxmlformats.org/presentationml/2006/main" showMasterSp="0" type="title" preserve="1">
   <p:cSld name="Title Slide">
@@ -331,7 +785,7 @@
           <a:p>
             <a:fld id="{FFD8E3DA-06A7-4017-AD9B-43907ED0ACB3}" type="datetimeFigureOut">
               <a:rPr lang="en-US" smtClean="0"/>
-              <a:t>8/30/2022</a:t>
+              <a:t>8/31/22</a:t>
             </a:fld>
             <a:endParaRPr lang="en-US"/>
           </a:p>
@@ -767,7 +1221,7 @@
           <a:p>
             <a:fld id="{FFD8E3DA-06A7-4017-AD9B-43907ED0ACB3}" type="datetimeFigureOut">
               <a:rPr lang="en-US" smtClean="0"/>
-              <a:t>8/30/2022</a:t>
+              <a:t>8/31/22</a:t>
             </a:fld>
             <a:endParaRPr lang="en-US"/>
           </a:p>
@@ -1017,7 +1471,7 @@
           <a:p>
             <a:fld id="{FFD8E3DA-06A7-4017-AD9B-43907ED0ACB3}" type="datetimeFigureOut">
               <a:rPr lang="en-US" smtClean="0"/>
-              <a:t>8/30/2022</a:t>
+              <a:t>8/31/22</a:t>
             </a:fld>
             <a:endParaRPr lang="en-US"/>
           </a:p>
@@ -1325,7 +1779,7 @@
           <a:p>
             <a:fld id="{FFD8E3DA-06A7-4017-AD9B-43907ED0ACB3}" type="datetimeFigureOut">
               <a:rPr lang="en-US" smtClean="0"/>
-              <a:t>8/30/2022</a:t>
+              <a:t>8/31/22</a:t>
             </a:fld>
             <a:endParaRPr lang="en-US"/>
           </a:p>
@@ -1643,7 +2097,7 @@
           <a:p>
             <a:fld id="{FFD8E3DA-06A7-4017-AD9B-43907ED0ACB3}" type="datetimeFigureOut">
               <a:rPr lang="en-US" smtClean="0"/>
-              <a:t>8/30/2022</a:t>
+              <a:t>8/31/22</a:t>
             </a:fld>
             <a:endParaRPr lang="en-US"/>
           </a:p>
@@ -1945,7 +2399,7 @@
           <a:p>
             <a:fld id="{FFD8E3DA-06A7-4017-AD9B-43907ED0ACB3}" type="datetimeFigureOut">
               <a:rPr lang="en-US" smtClean="0"/>
-              <a:t>8/30/2022</a:t>
+              <a:t>8/31/22</a:t>
             </a:fld>
             <a:endParaRPr lang="en-US"/>
           </a:p>
@@ -2312,7 +2766,7 @@
           <a:p>
             <a:fld id="{FFD8E3DA-06A7-4017-AD9B-43907ED0ACB3}" type="datetimeFigureOut">
               <a:rPr lang="en-US" smtClean="0"/>
-              <a:t>8/30/2022</a:t>
+              <a:t>8/31/22</a:t>
             </a:fld>
             <a:endParaRPr lang="en-US"/>
           </a:p>
@@ -2486,7 +2940,7 @@
           <a:p>
             <a:fld id="{FFD8E3DA-06A7-4017-AD9B-43907ED0ACB3}" type="datetimeFigureOut">
               <a:rPr lang="en-US" smtClean="0"/>
-              <a:t>8/30/2022</a:t>
+              <a:t>8/31/22</a:t>
             </a:fld>
             <a:endParaRPr lang="en-US"/>
           </a:p>
@@ -2666,7 +3120,7 @@
           <a:p>
             <a:fld id="{FFD8E3DA-06A7-4017-AD9B-43907ED0ACB3}" type="datetimeFigureOut">
               <a:rPr lang="en-US" smtClean="0"/>
-              <a:t>8/30/2022</a:t>
+              <a:t>8/31/22</a:t>
             </a:fld>
             <a:endParaRPr lang="en-US"/>
           </a:p>
@@ -2836,7 +3290,7 @@
           <a:p>
             <a:fld id="{FFD8E3DA-06A7-4017-AD9B-43907ED0ACB3}" type="datetimeFigureOut">
               <a:rPr lang="en-US" smtClean="0"/>
-              <a:t>8/30/2022</a:t>
+              <a:t>8/31/22</a:t>
             </a:fld>
             <a:endParaRPr lang="en-US"/>
           </a:p>
@@ -3086,7 +3540,7 @@
           <a:p>
             <a:fld id="{FFD8E3DA-06A7-4017-AD9B-43907ED0ACB3}" type="datetimeFigureOut">
               <a:rPr lang="en-US" smtClean="0"/>
-              <a:t>8/30/2022</a:t>
+              <a:t>8/31/22</a:t>
             </a:fld>
             <a:endParaRPr lang="en-US"/>
           </a:p>
@@ -3322,7 +3776,7 @@
           <a:p>
             <a:fld id="{FFD8E3DA-06A7-4017-AD9B-43907ED0ACB3}" type="datetimeFigureOut">
               <a:rPr lang="en-US" smtClean="0"/>
-              <a:t>8/30/2022</a:t>
+              <a:t>8/31/22</a:t>
             </a:fld>
             <a:endParaRPr lang="en-US"/>
           </a:p>
@@ -3704,7 +4158,7 @@
           <a:p>
             <a:fld id="{FFD8E3DA-06A7-4017-AD9B-43907ED0ACB3}" type="datetimeFigureOut">
               <a:rPr lang="en-US" smtClean="0"/>
-              <a:t>8/30/2022</a:t>
+              <a:t>8/31/22</a:t>
             </a:fld>
             <a:endParaRPr lang="en-US"/>
           </a:p>
@@ -3822,7 +4276,7 @@
           <a:p>
             <a:fld id="{FFD8E3DA-06A7-4017-AD9B-43907ED0ACB3}" type="datetimeFigureOut">
               <a:rPr lang="en-US" smtClean="0"/>
-              <a:t>8/30/2022</a:t>
+              <a:t>8/31/22</a:t>
             </a:fld>
             <a:endParaRPr lang="en-US"/>
           </a:p>
@@ -3917,7 +4371,7 @@
           <a:p>
             <a:fld id="{FFD8E3DA-06A7-4017-AD9B-43907ED0ACB3}" type="datetimeFigureOut">
               <a:rPr lang="en-US" smtClean="0"/>
-              <a:t>8/30/2022</a:t>
+              <a:t>8/31/22</a:t>
             </a:fld>
             <a:endParaRPr lang="en-US"/>
           </a:p>
@@ -4172,7 +4626,7 @@
           <a:p>
             <a:fld id="{FFD8E3DA-06A7-4017-AD9B-43907ED0ACB3}" type="datetimeFigureOut">
               <a:rPr lang="en-US" smtClean="0"/>
-              <a:t>8/30/2022</a:t>
+              <a:t>8/31/22</a:t>
             </a:fld>
             <a:endParaRPr lang="en-US"/>
           </a:p>
@@ -4455,7 +4909,7 @@
           <a:p>
             <a:fld id="{FFD8E3DA-06A7-4017-AD9B-43907ED0ACB3}" type="datetimeFigureOut">
               <a:rPr lang="en-US" smtClean="0"/>
-              <a:t>8/30/2022</a:t>
+              <a:t>8/31/22</a:t>
             </a:fld>
             <a:endParaRPr lang="en-US"/>
           </a:p>
@@ -4861,7 +5315,7 @@
           <a:p>
             <a:fld id="{FFD8E3DA-06A7-4017-AD9B-43907ED0ACB3}" type="datetimeFigureOut">
               <a:rPr lang="en-US" smtClean="0"/>
-              <a:t>8/30/2022</a:t>
+              <a:t>8/31/22</a:t>
             </a:fld>
             <a:endParaRPr lang="en-US"/>
           </a:p>
@@ -6755,7 +7209,7 @@
           <p:cNvPr id="2" name="Title 1">
             <a:extLst>
               <a:ext uri="{FF2B5EF4-FFF2-40B4-BE49-F238E27FC236}">
-                <a16:creationId xmlns:a16="http://schemas.microsoft.com/office/drawing/2014/main" id="{0DE88B27-91BE-400E-0903-D77712F4FFB1}"/>
+                <a16:creationId xmlns:a16="http://schemas.microsoft.com/office/drawing/2014/main" id="{19D4D171-A7DB-FADF-EFC7-345CF41B7FE4}"/>
               </a:ext>
             </a:extLst>
           </p:cNvPr>
@@ -6763,40 +7217,31 @@
             <a:spLocks noGrp="1"/>
           </p:cNvSpPr>
           <p:nvPr>
-            <p:ph type="ctrTitle"/>
+            <p:ph type="title"/>
           </p:nvPr>
         </p:nvSpPr>
         <p:spPr>
           <a:xfrm>
-            <a:off x="684211" y="605750"/>
-            <a:ext cx="9553986" cy="1106906"/>
+            <a:off x="1444927" y="0"/>
+            <a:ext cx="8534401" cy="1498600"/>
           </a:xfrm>
         </p:spPr>
         <p:txBody>
-          <a:bodyPr/>
+          <a:bodyPr>
+            <a:normAutofit/>
+          </a:bodyPr>
           <a:lstStyle/>
           <a:p>
             <a:pPr algn="ctr"/>
             <a:r>
-              <a:rPr lang="en-US" dirty="0">
+              <a:rPr lang="en-US" sz="4000" dirty="0">
                 <a:solidFill>
                   <a:srgbClr val="FFFF00"/>
                 </a:solidFill>
                 <a:latin typeface="Algerian" panose="04020705040A02060702" pitchFamily="82" charset="0"/>
               </a:rPr>
-              <a:t>conclusion</a:t>
-            </a:r>
-            <a:r>
-              <a:rPr lang="en-US" sz="4800" b="0" i="0" dirty="0">
-                <a:solidFill>
-                  <a:srgbClr val="FFFF00"/>
-                </a:solidFill>
-                <a:effectLst/>
-                <a:latin typeface="Algerian" panose="04020705040A02060702" pitchFamily="82" charset="0"/>
-              </a:rPr>
-              <a:t>:</a:t>
-            </a:r>
-            <a:endParaRPr lang="en-US" dirty="0"/>
+              <a:t>Project challenges:</a:t>
+            </a:r>
           </a:p>
         </p:txBody>
       </p:sp>
@@ -6805,7 +7250,7 @@
           <p:cNvPr id="5" name="Text Placeholder 2">
             <a:extLst>
               <a:ext uri="{FF2B5EF4-FFF2-40B4-BE49-F238E27FC236}">
-                <a16:creationId xmlns:a16="http://schemas.microsoft.com/office/drawing/2014/main" id="{93CC2FA0-9013-117A-973F-4A732FF51938}"/>
+                <a16:creationId xmlns:a16="http://schemas.microsoft.com/office/drawing/2014/main" id="{212CBFA9-6D07-26EB-19E7-69FC311923A6}"/>
               </a:ext>
             </a:extLst>
           </p:cNvPr>
@@ -6816,8 +7261,8 @@
         </p:nvSpPr>
         <p:spPr>
           <a:xfrm>
-            <a:off x="1427445" y="1930400"/>
-            <a:ext cx="8534400" cy="2092960"/>
+            <a:off x="1314829" y="1694021"/>
+            <a:ext cx="8534400" cy="1957296"/>
           </a:xfrm>
           <a:prstGeom prst="rect">
             <a:avLst/>
@@ -6825,7 +7270,7 @@
         </p:spPr>
         <p:txBody>
           <a:bodyPr vert="horz" lIns="91440" tIns="45720" rIns="91440" bIns="45720" rtlCol="0" anchor="t">
-            <a:normAutofit fontScale="77500" lnSpcReduction="20000"/>
+            <a:normAutofit fontScale="92500"/>
           </a:bodyPr>
           <a:lstStyle>
             <a:lvl1pPr marL="0" indent="0" algn="l" defTabSz="457200" rtl="0" eaLnBrk="1" latinLnBrk="0" hangingPunct="1">
@@ -7066,7 +7511,7 @@
                 </a:solidFill>
                 <a:latin typeface="Bookman Old Style" panose="02050604050505020204" pitchFamily="18" charset="0"/>
               </a:rPr>
-              <a:t>As we had hoped, our linear regression model was a strong choice for our dataset. </a:t>
+              <a:t>Time associated with dataset selection. </a:t>
             </a:r>
           </a:p>
           <a:p>
@@ -7081,7 +7526,7 @@
                 </a:solidFill>
                 <a:latin typeface="Bookman Old Style" panose="02050604050505020204" pitchFamily="18" charset="0"/>
               </a:rPr>
-              <a:t>We received high scores on both training and test. </a:t>
+              <a:t>Workload associated with data cleaning and model optimization.</a:t>
             </a:r>
           </a:p>
           <a:p>
@@ -7096,7 +7541,7 @@
                 </a:solidFill>
                 <a:latin typeface="Bookman Old Style" panose="02050604050505020204" pitchFamily="18" charset="0"/>
               </a:rPr>
-              <a:t>After attempting optimization, we saw a favorable increase in the training. However, the increase was marginal at best for the test</a:t>
+              <a:t>Data size was very large, took a lot of time to train the models.</a:t>
             </a:r>
           </a:p>
           <a:p>
@@ -7111,7 +7556,7 @@
                 </a:solidFill>
                 <a:latin typeface="Bookman Old Style" panose="02050604050505020204" pitchFamily="18" charset="0"/>
               </a:rPr>
-              <a:t>Going forward, we would have the opportunity to further test our model with the application dataset which would provide a realistic test for live deployment.</a:t>
+              <a:t>Get dummies trap</a:t>
             </a:r>
           </a:p>
           <a:p>
@@ -7123,10 +7568,60 @@
           </a:p>
         </p:txBody>
       </p:sp>
+      <p:sp>
+        <p:nvSpPr>
+          <p:cNvPr id="3" name="TextBox 2">
+            <a:extLst>
+              <a:ext uri="{FF2B5EF4-FFF2-40B4-BE49-F238E27FC236}">
+                <a16:creationId xmlns:a16="http://schemas.microsoft.com/office/drawing/2014/main" id="{7D2955D6-4E01-A591-7CBB-2802A382E9C9}"/>
+              </a:ext>
+            </a:extLst>
+          </p:cNvPr>
+          <p:cNvSpPr txBox="1"/>
+          <p:nvPr/>
+        </p:nvSpPr>
+        <p:spPr>
+          <a:xfrm>
+            <a:off x="1444927" y="5804034"/>
+            <a:ext cx="7613583" cy="276999"/>
+          </a:xfrm>
+          <a:prstGeom prst="rect">
+            <a:avLst/>
+          </a:prstGeom>
+          <a:noFill/>
+        </p:spPr>
+        <p:txBody>
+          <a:bodyPr wrap="square" rtlCol="0">
+            <a:spAutoFit/>
+          </a:bodyPr>
+          <a:lstStyle/>
+          <a:p>
+            <a:r>
+              <a:rPr lang="en-US" sz="1200" dirty="0"/>
+              <a:t>Get </a:t>
+            </a:r>
+            <a:r>
+              <a:rPr lang="en-US" sz="1200"/>
+              <a:t>Dummies Trap Source</a:t>
+            </a:r>
+            <a:r>
+              <a:rPr lang="en-US" sz="1200" dirty="0"/>
+              <a:t>: </a:t>
+            </a:r>
+            <a:r>
+              <a:rPr lang="en-US" sz="1200" dirty="0">
+                <a:hlinkClick r:id="rId2"/>
+              </a:rPr>
+              <a:t>https://builtin.com/machine-learning/dummy-variable-trap-pandas</a:t>
+            </a:r>
+            <a:endParaRPr lang="en-US" sz="1200" dirty="0"/>
+          </a:p>
+        </p:txBody>
+      </p:sp>
     </p:spTree>
     <p:extLst>
       <p:ext uri="{BB962C8B-B14F-4D97-AF65-F5344CB8AC3E}">
-        <p14:creationId xmlns:p14="http://schemas.microsoft.com/office/powerpoint/2010/main" val="2796645175"/>
+        <p14:creationId xmlns:p14="http://schemas.microsoft.com/office/powerpoint/2010/main" val="2430088434"/>
       </p:ext>
     </p:extLst>
   </p:cSld>
@@ -7158,7 +7653,7 @@
           <p:cNvPr id="2" name="Title 1">
             <a:extLst>
               <a:ext uri="{FF2B5EF4-FFF2-40B4-BE49-F238E27FC236}">
-                <a16:creationId xmlns:a16="http://schemas.microsoft.com/office/drawing/2014/main" id="{19D4D171-A7DB-FADF-EFC7-345CF41B7FE4}"/>
+                <a16:creationId xmlns:a16="http://schemas.microsoft.com/office/drawing/2014/main" id="{0DE88B27-91BE-400E-0903-D77712F4FFB1}"/>
               </a:ext>
             </a:extLst>
           </p:cNvPr>
@@ -7166,31 +7661,40 @@
             <a:spLocks noGrp="1"/>
           </p:cNvSpPr>
           <p:nvPr>
-            <p:ph type="title"/>
+            <p:ph type="ctrTitle"/>
           </p:nvPr>
         </p:nvSpPr>
         <p:spPr>
           <a:xfrm>
-            <a:off x="1444927" y="0"/>
-            <a:ext cx="8534401" cy="1498600"/>
+            <a:off x="684211" y="605750"/>
+            <a:ext cx="9553986" cy="1106906"/>
           </a:xfrm>
         </p:spPr>
         <p:txBody>
-          <a:bodyPr>
-            <a:normAutofit/>
-          </a:bodyPr>
+          <a:bodyPr/>
           <a:lstStyle/>
           <a:p>
             <a:pPr algn="ctr"/>
             <a:r>
-              <a:rPr lang="en-US" sz="4000" dirty="0">
+              <a:rPr lang="en-US" dirty="0">
                 <a:solidFill>
                   <a:srgbClr val="FFFF00"/>
                 </a:solidFill>
                 <a:latin typeface="Algerian" panose="04020705040A02060702" pitchFamily="82" charset="0"/>
               </a:rPr>
-              <a:t>Technical challenges:</a:t>
-            </a:r>
+              <a:t>conclusion</a:t>
+            </a:r>
+            <a:r>
+              <a:rPr lang="en-US" sz="4800" b="0" i="0" dirty="0">
+                <a:solidFill>
+                  <a:srgbClr val="FFFF00"/>
+                </a:solidFill>
+                <a:effectLst/>
+                <a:latin typeface="Algerian" panose="04020705040A02060702" pitchFamily="82" charset="0"/>
+              </a:rPr>
+              <a:t>:</a:t>
+            </a:r>
+            <a:endParaRPr lang="en-US" dirty="0"/>
           </a:p>
         </p:txBody>
       </p:sp>
@@ -7199,7 +7703,7 @@
           <p:cNvPr id="5" name="Text Placeholder 2">
             <a:extLst>
               <a:ext uri="{FF2B5EF4-FFF2-40B4-BE49-F238E27FC236}">
-                <a16:creationId xmlns:a16="http://schemas.microsoft.com/office/drawing/2014/main" id="{212CBFA9-6D07-26EB-19E7-69FC311923A6}"/>
+                <a16:creationId xmlns:a16="http://schemas.microsoft.com/office/drawing/2014/main" id="{93CC2FA0-9013-117A-973F-4A732FF51938}"/>
               </a:ext>
             </a:extLst>
           </p:cNvPr>
@@ -7210,8 +7714,8 @@
         </p:nvSpPr>
         <p:spPr>
           <a:xfrm>
-            <a:off x="1372581" y="1471704"/>
-            <a:ext cx="8534400" cy="1957296"/>
+            <a:off x="1427445" y="1930399"/>
+            <a:ext cx="9553986" cy="4133517"/>
           </a:xfrm>
           <a:prstGeom prst="rect">
             <a:avLst/>
@@ -7219,7 +7723,7 @@
         </p:spPr>
         <p:txBody>
           <a:bodyPr vert="horz" lIns="91440" tIns="45720" rIns="91440" bIns="45720" rtlCol="0" anchor="t">
-            <a:normAutofit fontScale="92500" lnSpcReduction="20000"/>
+            <a:noAutofit/>
           </a:bodyPr>
           <a:lstStyle>
             <a:lvl1pPr marL="0" indent="0" algn="l" defTabSz="457200" rtl="0" eaLnBrk="1" latinLnBrk="0" hangingPunct="1">
@@ -7454,13 +7958,13 @@
               <a:buChar char="Ø"/>
             </a:pPr>
             <a:r>
-              <a:rPr lang="en-US" dirty="0">
+              <a:rPr lang="en-US" sz="1600" dirty="0">
                 <a:solidFill>
                   <a:schemeClr val="tx1"/>
                 </a:solidFill>
                 <a:latin typeface="Bookman Old Style" panose="02050604050505020204" pitchFamily="18" charset="0"/>
               </a:rPr>
-              <a:t>Time associated with dataset selection. </a:t>
+              <a:t>As we had hoped, our logistic regression and random forest model were strong choices for our dataset. </a:t>
             </a:r>
           </a:p>
           <a:p>
@@ -7469,13 +7973,13 @@
               <a:buChar char="Ø"/>
             </a:pPr>
             <a:r>
-              <a:rPr lang="en-US" dirty="0">
+              <a:rPr lang="en-US" sz="1600" dirty="0">
                 <a:solidFill>
                   <a:schemeClr val="tx1"/>
                 </a:solidFill>
                 <a:latin typeface="Bookman Old Style" panose="02050604050505020204" pitchFamily="18" charset="0"/>
               </a:rPr>
-              <a:t>Workload associated with data cleaning and optimization.</a:t>
+              <a:t>We received high accuracy scores on both training and test datasets for each model. After attempting optimization, we saw a favorable increase in training. However, the increase was marginal at best for the test.</a:t>
             </a:r>
           </a:p>
           <a:p>
@@ -7484,13 +7988,13 @@
               <a:buChar char="Ø"/>
             </a:pPr>
             <a:r>
-              <a:rPr lang="en-US" dirty="0">
+              <a:rPr lang="en-US" sz="1600" dirty="0">
                 <a:solidFill>
                   <a:schemeClr val="tx1"/>
                 </a:solidFill>
                 <a:latin typeface="Bookman Old Style" panose="02050604050505020204" pitchFamily="18" charset="0"/>
               </a:rPr>
-              <a:t>Data size.</a:t>
+              <a:t>Random Forest Classifier, with 100 estimators, gave us the best accuracy (83.1%). </a:t>
             </a:r>
           </a:p>
           <a:p>
@@ -7499,13 +8003,13 @@
               <a:buChar char="Ø"/>
             </a:pPr>
             <a:r>
-              <a:rPr lang="en-US" dirty="0">
+              <a:rPr lang="en-US" sz="1600" dirty="0">
                 <a:solidFill>
                   <a:schemeClr val="tx1"/>
                 </a:solidFill>
                 <a:latin typeface="Bookman Old Style" panose="02050604050505020204" pitchFamily="18" charset="0"/>
               </a:rPr>
-              <a:t>Get dummies trap.</a:t>
+              <a:t>Going forward, we would want to add more data and look for data with minimal to no null values. </a:t>
             </a:r>
           </a:p>
           <a:p>
@@ -7514,22 +8018,13 @@
               <a:buChar char="Ø"/>
             </a:pPr>
             <a:r>
-              <a:rPr lang="en-US" dirty="0" err="1">
+              <a:rPr lang="en-US" sz="1600" dirty="0">
                 <a:solidFill>
                   <a:schemeClr val="tx1"/>
                 </a:solidFill>
                 <a:latin typeface="Bookman Old Style" panose="02050604050505020204" pitchFamily="18" charset="0"/>
               </a:rPr>
-              <a:t>Github</a:t>
-            </a:r>
-            <a:r>
-              <a:rPr lang="en-US" dirty="0">
-                <a:solidFill>
-                  <a:schemeClr val="tx1"/>
-                </a:solidFill>
-                <a:latin typeface="Bookman Old Style" panose="02050604050505020204" pitchFamily="18" charset="0"/>
-              </a:rPr>
-              <a:t> debacle.</a:t>
+              <a:t>Try other models (Decision Tree Classifier, Deep Neural Networks, etc.).</a:t>
             </a:r>
           </a:p>
           <a:p>
@@ -7537,26 +8032,22 @@
               <a:buFont typeface="Wingdings" panose="05000000000000000000" pitchFamily="2" charset="2"/>
               <a:buChar char="Ø"/>
             </a:pPr>
-            <a:endParaRPr lang="en-US" dirty="0">
-              <a:solidFill>
-                <a:schemeClr val="tx1"/>
-              </a:solidFill>
-              <a:latin typeface="Bookman Old Style" panose="02050604050505020204" pitchFamily="18" charset="0"/>
-            </a:endParaRPr>
-          </a:p>
-          <a:p>
-            <a:pPr marL="285750" indent="-285750">
-              <a:buFont typeface="Wingdings" panose="05000000000000000000" pitchFamily="2" charset="2"/>
-              <a:buChar char="Ø"/>
-            </a:pPr>
-            <a:endParaRPr lang="en-US" dirty="0"/>
+            <a:r>
+              <a:rPr lang="en-US" sz="1600" dirty="0">
+                <a:solidFill>
+                  <a:schemeClr val="tx1"/>
+                </a:solidFill>
+                <a:latin typeface="Bookman Old Style" panose="02050604050505020204" pitchFamily="18" charset="0"/>
+              </a:rPr>
+              <a:t>Future enhancement would be to include flask front end app.</a:t>
+            </a:r>
           </a:p>
         </p:txBody>
       </p:sp>
     </p:spTree>
     <p:extLst>
       <p:ext uri="{BB962C8B-B14F-4D97-AF65-F5344CB8AC3E}">
-        <p14:creationId xmlns:p14="http://schemas.microsoft.com/office/powerpoint/2010/main" val="2430088434"/>
+        <p14:creationId xmlns:p14="http://schemas.microsoft.com/office/powerpoint/2010/main" val="2796645175"/>
       </p:ext>
     </p:extLst>
   </p:cSld>
@@ -9550,4 +10041,299 @@
     </a:ext>
   </a:extLst>
 </a:theme>
+</file>
+
+<file path=ppt/theme/theme2.xml><?xml version="1.0" encoding="utf-8"?>
+<a:theme xmlns:a="http://schemas.openxmlformats.org/drawingml/2006/main" name="Office Theme">
+  <a:themeElements>
+    <a:clrScheme name="Office">
+      <a:dk1>
+        <a:sysClr val="windowText" lastClr="000000"/>
+      </a:dk1>
+      <a:lt1>
+        <a:sysClr val="window" lastClr="FFFFFF"/>
+      </a:lt1>
+      <a:dk2>
+        <a:srgbClr val="44546A"/>
+      </a:dk2>
+      <a:lt2>
+        <a:srgbClr val="E7E6E6"/>
+      </a:lt2>
+      <a:accent1>
+        <a:srgbClr val="4472C4"/>
+      </a:accent1>
+      <a:accent2>
+        <a:srgbClr val="ED7D31"/>
+      </a:accent2>
+      <a:accent3>
+        <a:srgbClr val="A5A5A5"/>
+      </a:accent3>
+      <a:accent4>
+        <a:srgbClr val="FFC000"/>
+      </a:accent4>
+      <a:accent5>
+        <a:srgbClr val="5B9BD5"/>
+      </a:accent5>
+      <a:accent6>
+        <a:srgbClr val="70AD47"/>
+      </a:accent6>
+      <a:hlink>
+        <a:srgbClr val="0563C1"/>
+      </a:hlink>
+      <a:folHlink>
+        <a:srgbClr val="954F72"/>
+      </a:folHlink>
+    </a:clrScheme>
+    <a:fontScheme name="Office">
+      <a:majorFont>
+        <a:latin typeface="Calibri Light" panose="020F0302020204030204"/>
+        <a:ea typeface=""/>
+        <a:cs typeface=""/>
+        <a:font script="Jpan" typeface="游ゴシック Light"/>
+        <a:font script="Hang" typeface="맑은 고딕"/>
+        <a:font script="Hans" typeface="等线 Light"/>
+        <a:font script="Hant" typeface="新細明體"/>
+        <a:font script="Arab" typeface="Times New Roman"/>
+        <a:font script="Hebr" typeface="Times New Roman"/>
+        <a:font script="Thai" typeface="Angsana New"/>
+        <a:font script="Ethi" typeface="Nyala"/>
+        <a:font script="Beng" typeface="Vrinda"/>
+        <a:font script="Gujr" typeface="Shruti"/>
+        <a:font script="Khmr" typeface="MoolBoran"/>
+        <a:font script="Knda" typeface="Tunga"/>
+        <a:font script="Guru" typeface="Raavi"/>
+        <a:font script="Cans" typeface="Euphemia"/>
+        <a:font script="Cher" typeface="Plantagenet Cherokee"/>
+        <a:font script="Yiii" typeface="Microsoft Yi Baiti"/>
+        <a:font script="Tibt" typeface="Microsoft Himalaya"/>
+        <a:font script="Thaa" typeface="MV Boli"/>
+        <a:font script="Deva" typeface="Mangal"/>
+        <a:font script="Telu" typeface="Gautami"/>
+        <a:font script="Taml" typeface="Latha"/>
+        <a:font script="Syrc" typeface="Estrangelo Edessa"/>
+        <a:font script="Orya" typeface="Kalinga"/>
+        <a:font script="Mlym" typeface="Kartika"/>
+        <a:font script="Laoo" typeface="DokChampa"/>
+        <a:font script="Sinh" typeface="Iskoola Pota"/>
+        <a:font script="Mong" typeface="Mongolian Baiti"/>
+        <a:font script="Viet" typeface="Times New Roman"/>
+        <a:font script="Uigh" typeface="Microsoft Uighur"/>
+        <a:font script="Geor" typeface="Sylfaen"/>
+        <a:font script="Armn" typeface="Arial"/>
+        <a:font script="Bugi" typeface="Leelawadee UI"/>
+        <a:font script="Bopo" typeface="Microsoft JhengHei"/>
+        <a:font script="Java" typeface="Javanese Text"/>
+        <a:font script="Lisu" typeface="Segoe UI"/>
+        <a:font script="Mymr" typeface="Myanmar Text"/>
+        <a:font script="Nkoo" typeface="Ebrima"/>
+        <a:font script="Olck" typeface="Nirmala UI"/>
+        <a:font script="Osma" typeface="Ebrima"/>
+        <a:font script="Phag" typeface="Phagspa"/>
+        <a:font script="Syrn" typeface="Estrangelo Edessa"/>
+        <a:font script="Syrj" typeface="Estrangelo Edessa"/>
+        <a:font script="Syre" typeface="Estrangelo Edessa"/>
+        <a:font script="Sora" typeface="Nirmala UI"/>
+        <a:font script="Tale" typeface="Microsoft Tai Le"/>
+        <a:font script="Talu" typeface="Microsoft New Tai Lue"/>
+        <a:font script="Tfng" typeface="Ebrima"/>
+      </a:majorFont>
+      <a:minorFont>
+        <a:latin typeface="Calibri" panose="020F0502020204030204"/>
+        <a:ea typeface=""/>
+        <a:cs typeface=""/>
+        <a:font script="Jpan" typeface="游ゴシック"/>
+        <a:font script="Hang" typeface="맑은 고딕"/>
+        <a:font script="Hans" typeface="等线"/>
+        <a:font script="Hant" typeface="新細明體"/>
+        <a:font script="Arab" typeface="Arial"/>
+        <a:font script="Hebr" typeface="Arial"/>
+        <a:font script="Thai" typeface="Cordia New"/>
+        <a:font script="Ethi" typeface="Nyala"/>
+        <a:font script="Beng" typeface="Vrinda"/>
+        <a:font script="Gujr" typeface="Shruti"/>
+        <a:font script="Khmr" typeface="DaunPenh"/>
+        <a:font script="Knda" typeface="Tunga"/>
+        <a:font script="Guru" typeface="Raavi"/>
+        <a:font script="Cans" typeface="Euphemia"/>
+        <a:font script="Cher" typeface="Plantagenet Cherokee"/>
+        <a:font script="Yiii" typeface="Microsoft Yi Baiti"/>
+        <a:font script="Tibt" typeface="Microsoft Himalaya"/>
+        <a:font script="Thaa" typeface="MV Boli"/>
+        <a:font script="Deva" typeface="Mangal"/>
+        <a:font script="Telu" typeface="Gautami"/>
+        <a:font script="Taml" typeface="Latha"/>
+        <a:font script="Syrc" typeface="Estrangelo Edessa"/>
+        <a:font script="Orya" typeface="Kalinga"/>
+        <a:font script="Mlym" typeface="Kartika"/>
+        <a:font script="Laoo" typeface="DokChampa"/>
+        <a:font script="Sinh" typeface="Iskoola Pota"/>
+        <a:font script="Mong" typeface="Mongolian Baiti"/>
+        <a:font script="Viet" typeface="Arial"/>
+        <a:font script="Uigh" typeface="Microsoft Uighur"/>
+        <a:font script="Geor" typeface="Sylfaen"/>
+        <a:font script="Armn" typeface="Arial"/>
+        <a:font script="Bugi" typeface="Leelawadee UI"/>
+        <a:font script="Bopo" typeface="Microsoft JhengHei"/>
+        <a:font script="Java" typeface="Javanese Text"/>
+        <a:font script="Lisu" typeface="Segoe UI"/>
+        <a:font script="Mymr" typeface="Myanmar Text"/>
+        <a:font script="Nkoo" typeface="Ebrima"/>
+        <a:font script="Olck" typeface="Nirmala UI"/>
+        <a:font script="Osma" typeface="Ebrima"/>
+        <a:font script="Phag" typeface="Phagspa"/>
+        <a:font script="Syrn" typeface="Estrangelo Edessa"/>
+        <a:font script="Syrj" typeface="Estrangelo Edessa"/>
+        <a:font script="Syre" typeface="Estrangelo Edessa"/>
+        <a:font script="Sora" typeface="Nirmala UI"/>
+        <a:font script="Tale" typeface="Microsoft Tai Le"/>
+        <a:font script="Talu" typeface="Microsoft New Tai Lue"/>
+        <a:font script="Tfng" typeface="Ebrima"/>
+      </a:minorFont>
+    </a:fontScheme>
+    <a:fmtScheme name="Office">
+      <a:fillStyleLst>
+        <a:solidFill>
+          <a:schemeClr val="phClr"/>
+        </a:solidFill>
+        <a:gradFill rotWithShape="1">
+          <a:gsLst>
+            <a:gs pos="0">
+              <a:schemeClr val="phClr">
+                <a:lumMod val="110000"/>
+                <a:satMod val="105000"/>
+                <a:tint val="67000"/>
+              </a:schemeClr>
+            </a:gs>
+            <a:gs pos="50000">
+              <a:schemeClr val="phClr">
+                <a:lumMod val="105000"/>
+                <a:satMod val="103000"/>
+                <a:tint val="73000"/>
+              </a:schemeClr>
+            </a:gs>
+            <a:gs pos="100000">
+              <a:schemeClr val="phClr">
+                <a:lumMod val="105000"/>
+                <a:satMod val="109000"/>
+                <a:tint val="81000"/>
+              </a:schemeClr>
+            </a:gs>
+          </a:gsLst>
+          <a:lin ang="5400000" scaled="0"/>
+        </a:gradFill>
+        <a:gradFill rotWithShape="1">
+          <a:gsLst>
+            <a:gs pos="0">
+              <a:schemeClr val="phClr">
+                <a:satMod val="103000"/>
+                <a:lumMod val="102000"/>
+                <a:tint val="94000"/>
+              </a:schemeClr>
+            </a:gs>
+            <a:gs pos="50000">
+              <a:schemeClr val="phClr">
+                <a:satMod val="110000"/>
+                <a:lumMod val="100000"/>
+                <a:shade val="100000"/>
+              </a:schemeClr>
+            </a:gs>
+            <a:gs pos="100000">
+              <a:schemeClr val="phClr">
+                <a:lumMod val="99000"/>
+                <a:satMod val="120000"/>
+                <a:shade val="78000"/>
+              </a:schemeClr>
+            </a:gs>
+          </a:gsLst>
+          <a:lin ang="5400000" scaled="0"/>
+        </a:gradFill>
+      </a:fillStyleLst>
+      <a:lnStyleLst>
+        <a:ln w="6350" cap="flat" cmpd="sng" algn="ctr">
+          <a:solidFill>
+            <a:schemeClr val="phClr"/>
+          </a:solidFill>
+          <a:prstDash val="solid"/>
+          <a:miter lim="800000"/>
+        </a:ln>
+        <a:ln w="12700" cap="flat" cmpd="sng" algn="ctr">
+          <a:solidFill>
+            <a:schemeClr val="phClr"/>
+          </a:solidFill>
+          <a:prstDash val="solid"/>
+          <a:miter lim="800000"/>
+        </a:ln>
+        <a:ln w="19050" cap="flat" cmpd="sng" algn="ctr">
+          <a:solidFill>
+            <a:schemeClr val="phClr"/>
+          </a:solidFill>
+          <a:prstDash val="solid"/>
+          <a:miter lim="800000"/>
+        </a:ln>
+      </a:lnStyleLst>
+      <a:effectStyleLst>
+        <a:effectStyle>
+          <a:effectLst/>
+        </a:effectStyle>
+        <a:effectStyle>
+          <a:effectLst/>
+        </a:effectStyle>
+        <a:effectStyle>
+          <a:effectLst>
+            <a:outerShdw blurRad="57150" dist="19050" dir="5400000" algn="ctr" rotWithShape="0">
+              <a:srgbClr val="000000">
+                <a:alpha val="63000"/>
+              </a:srgbClr>
+            </a:outerShdw>
+          </a:effectLst>
+        </a:effectStyle>
+      </a:effectStyleLst>
+      <a:bgFillStyleLst>
+        <a:solidFill>
+          <a:schemeClr val="phClr"/>
+        </a:solidFill>
+        <a:solidFill>
+          <a:schemeClr val="phClr">
+            <a:tint val="95000"/>
+            <a:satMod val="170000"/>
+          </a:schemeClr>
+        </a:solidFill>
+        <a:gradFill rotWithShape="1">
+          <a:gsLst>
+            <a:gs pos="0">
+              <a:schemeClr val="phClr">
+                <a:tint val="93000"/>
+                <a:satMod val="150000"/>
+                <a:shade val="98000"/>
+                <a:lumMod val="102000"/>
+              </a:schemeClr>
+            </a:gs>
+            <a:gs pos="50000">
+              <a:schemeClr val="phClr">
+                <a:tint val="98000"/>
+                <a:satMod val="130000"/>
+                <a:shade val="90000"/>
+                <a:lumMod val="103000"/>
+              </a:schemeClr>
+            </a:gs>
+            <a:gs pos="100000">
+              <a:schemeClr val="phClr">
+                <a:shade val="63000"/>
+                <a:satMod val="120000"/>
+              </a:schemeClr>
+            </a:gs>
+          </a:gsLst>
+          <a:lin ang="5400000" scaled="0"/>
+        </a:gradFill>
+      </a:bgFillStyleLst>
+    </a:fmtScheme>
+  </a:themeElements>
+  <a:objectDefaults/>
+  <a:extraClrSchemeLst/>
+  <a:extLst>
+    <a:ext uri="{05A4C25C-085E-4340-85A3-A5531E510DB2}">
+      <thm15:themeFamily xmlns:thm15="http://schemas.microsoft.com/office/thememl/2012/main" name="Office Theme" id="{62F939B6-93AF-4DB8-9C6B-D6C7DFDC589F}" vid="{4A3C46E8-61CC-4603-A589-7422A47A8E4A}"/>
+    </a:ext>
+  </a:extLst>
+</a:theme>
 </file>
</xml_diff>